<commit_message>
Development of Intelligent Digital Certificate Fuzzer Tool
</commit_message>
<xml_diff>
--- a/Presentation/20190222_Rabin.pptx
+++ b/Presentation/20190222_Rabin.pptx
@@ -219,7 +219,7 @@
             <a:fld id="{CB3D2ACE-279A-4319-8204-FE4A3DAF1277}" type="datetimeFigureOut">
               <a:rPr lang="en-US" smtClean="0"/>
               <a:pPr/>
-              <a:t>2/22/19</a:t>
+              <a:t>9/5/19</a:t>
             </a:fld>
             <a:endParaRPr lang="en-US"/>
           </a:p>
@@ -1761,7 +1761,7 @@
             <a:fld id="{B61BEF0D-F0BB-DE4B-95CE-6DB70DBA9567}" type="datetimeFigureOut">
               <a:rPr lang="en-US" smtClean="0"/>
               <a:pPr/>
-              <a:t>2/22/19</a:t>
+              <a:t>9/5/19</a:t>
             </a:fld>
             <a:endParaRPr lang="en-US" dirty="0"/>
           </a:p>
@@ -1942,7 +1942,7 @@
             <a:fld id="{B61BEF0D-F0BB-DE4B-95CE-6DB70DBA9567}" type="datetimeFigureOut">
               <a:rPr lang="en-US" smtClean="0"/>
               <a:pPr/>
-              <a:t>2/22/19</a:t>
+              <a:t>9/5/19</a:t>
             </a:fld>
             <a:endParaRPr lang="en-US" dirty="0"/>
           </a:p>
@@ -2124,7 +2124,7 @@
             <a:fld id="{B61BEF0D-F0BB-DE4B-95CE-6DB70DBA9567}" type="datetimeFigureOut">
               <a:rPr lang="en-US" smtClean="0"/>
               <a:pPr/>
-              <a:t>2/22/19</a:t>
+              <a:t>9/5/19</a:t>
             </a:fld>
             <a:endParaRPr lang="en-US" dirty="0"/>
           </a:p>
@@ -2296,7 +2296,7 @@
             <a:fld id="{B61BEF0D-F0BB-DE4B-95CE-6DB70DBA9567}" type="datetimeFigureOut">
               <a:rPr lang="en-US" smtClean="0"/>
               <a:pPr/>
-              <a:t>2/22/19</a:t>
+              <a:t>9/5/19</a:t>
             </a:fld>
             <a:endParaRPr lang="en-US" dirty="0"/>
           </a:p>
@@ -2611,7 +2611,7 @@
             <a:fld id="{B61BEF0D-F0BB-DE4B-95CE-6DB70DBA9567}" type="datetimeFigureOut">
               <a:rPr lang="en-US" smtClean="0"/>
               <a:pPr/>
-              <a:t>2/22/19</a:t>
+              <a:t>9/5/19</a:t>
             </a:fld>
             <a:endParaRPr lang="en-US" dirty="0"/>
           </a:p>
@@ -2999,7 +2999,7 @@
             <a:fld id="{B61BEF0D-F0BB-DE4B-95CE-6DB70DBA9567}" type="datetimeFigureOut">
               <a:rPr lang="en-US" smtClean="0"/>
               <a:pPr/>
-              <a:t>2/22/19</a:t>
+              <a:t>9/5/19</a:t>
             </a:fld>
             <a:endParaRPr lang="en-US" dirty="0"/>
           </a:p>
@@ -3435,7 +3435,7 @@
             <a:fld id="{B61BEF0D-F0BB-DE4B-95CE-6DB70DBA9567}" type="datetimeFigureOut">
               <a:rPr lang="en-US" smtClean="0"/>
               <a:pPr/>
-              <a:t>2/22/19</a:t>
+              <a:t>9/5/19</a:t>
             </a:fld>
             <a:endParaRPr lang="en-US" dirty="0"/>
           </a:p>
@@ -3555,7 +3555,7 @@
             <a:fld id="{B61BEF0D-F0BB-DE4B-95CE-6DB70DBA9567}" type="datetimeFigureOut">
               <a:rPr lang="en-US" smtClean="0"/>
               <a:pPr/>
-              <a:t>2/22/19</a:t>
+              <a:t>9/5/19</a:t>
             </a:fld>
             <a:endParaRPr lang="en-US" dirty="0"/>
           </a:p>
@@ -3652,7 +3652,7 @@
             <a:fld id="{B61BEF0D-F0BB-DE4B-95CE-6DB70DBA9567}" type="datetimeFigureOut">
               <a:rPr lang="en-US" smtClean="0"/>
               <a:pPr/>
-              <a:t>2/22/19</a:t>
+              <a:t>9/5/19</a:t>
             </a:fld>
             <a:endParaRPr lang="en-US" dirty="0"/>
           </a:p>
@@ -4004,7 +4004,7 @@
             <a:fld id="{B61BEF0D-F0BB-DE4B-95CE-6DB70DBA9567}" type="datetimeFigureOut">
               <a:rPr lang="en-US" smtClean="0"/>
               <a:pPr/>
-              <a:t>2/22/19</a:t>
+              <a:t>9/5/19</a:t>
             </a:fld>
             <a:endParaRPr lang="en-US" dirty="0"/>
           </a:p>
@@ -4431,7 +4431,7 @@
             <a:fld id="{B61BEF0D-F0BB-DE4B-95CE-6DB70DBA9567}" type="datetimeFigureOut">
               <a:rPr lang="en-US" smtClean="0"/>
               <a:pPr/>
-              <a:t>2/22/19</a:t>
+              <a:t>9/5/19</a:t>
             </a:fld>
             <a:endParaRPr lang="en-US" dirty="0"/>
           </a:p>
@@ -4714,7 +4714,7 @@
             <a:fld id="{B61BEF0D-F0BB-DE4B-95CE-6DB70DBA9567}" type="datetimeFigureOut">
               <a:rPr lang="en-US" smtClean="0"/>
               <a:pPr/>
-              <a:t>2/22/19</a:t>
+              <a:t>9/5/19</a:t>
             </a:fld>
             <a:endParaRPr lang="en-US" dirty="0"/>
           </a:p>

</xml_diff>